<commit_message>
2021.01.05 2145PST making all the spreadsheets...
</commit_message>
<xml_diff>
--- a/conceptdiagramforTankData.pptx
+++ b/conceptdiagramforTankData.pptx
@@ -9,6 +9,7 @@
     <p:sldId id="303" r:id="rId3"/>
     <p:sldId id="304" r:id="rId4"/>
     <p:sldId id="305" r:id="rId5"/>
+    <p:sldId id="306" r:id="rId6"/>
   </p:sldIdLst>
   <p:sldSz cx="12192000" cy="6858000"/>
   <p:notesSz cx="6858000" cy="9144000"/>
@@ -12238,6 +12239,763 @@
 </p:sld>
 </file>
 
+<file path=ppt/slides/slide5.xml><?xml version="1.0" encoding="utf-8"?>
+<p:sld xmlns:a="http://schemas.openxmlformats.org/drawingml/2006/main" xmlns:r="http://schemas.openxmlformats.org/officeDocument/2006/relationships" xmlns:p="http://schemas.openxmlformats.org/presentationml/2006/main">
+  <p:cSld>
+    <p:spTree>
+      <p:nvGrpSpPr>
+        <p:cNvPr id="1" name=""/>
+        <p:cNvGrpSpPr/>
+        <p:nvPr/>
+      </p:nvGrpSpPr>
+      <p:grpSpPr>
+        <a:xfrm>
+          <a:off x="0" y="0"/>
+          <a:ext cx="0" cy="0"/>
+          <a:chOff x="0" y="0"/>
+          <a:chExt cx="0" cy="0"/>
+        </a:xfrm>
+      </p:grpSpPr>
+      <p:sp>
+        <p:nvSpPr>
+          <p:cNvPr id="2" name="Rounded Rectangle 1">
+            <a:extLst>
+              <a:ext uri="{FF2B5EF4-FFF2-40B4-BE49-F238E27FC236}">
+                <a16:creationId xmlns:a16="http://schemas.microsoft.com/office/drawing/2014/main" id="{BCF0DE8C-9558-B246-A9C8-AB316CF5B625}"/>
+              </a:ext>
+            </a:extLst>
+          </p:cNvPr>
+          <p:cNvSpPr/>
+          <p:nvPr/>
+        </p:nvSpPr>
+        <p:spPr>
+          <a:xfrm>
+            <a:off x="1572483" y="2933778"/>
+            <a:ext cx="2162177" cy="846666"/>
+          </a:xfrm>
+          <a:prstGeom prst="roundRect">
+            <a:avLst/>
+          </a:prstGeom>
+          <a:solidFill>
+            <a:srgbClr val="93A594"/>
+          </a:solidFill>
+          <a:ln>
+            <a:noFill/>
+          </a:ln>
+        </p:spPr>
+        <p:style>
+          <a:lnRef idx="2">
+            <a:schemeClr val="accent1">
+              <a:shade val="50000"/>
+            </a:schemeClr>
+          </a:lnRef>
+          <a:fillRef idx="1">
+            <a:schemeClr val="accent1"/>
+          </a:fillRef>
+          <a:effectRef idx="0">
+            <a:schemeClr val="accent1"/>
+          </a:effectRef>
+          <a:fontRef idx="minor">
+            <a:schemeClr val="lt1"/>
+          </a:fontRef>
+        </p:style>
+        <p:txBody>
+          <a:bodyPr rtlCol="0" anchor="ctr"/>
+          <a:lstStyle/>
+          <a:p>
+            <a:pPr algn="ctr"/>
+            <a:r>
+              <a:rPr lang="en-US" dirty="0"/>
+              <a:t>SPEC pH Monitoring</a:t>
+            </a:r>
+          </a:p>
+        </p:txBody>
+      </p:sp>
+      <p:sp>
+        <p:nvSpPr>
+          <p:cNvPr id="3" name="Rounded Rectangle 2">
+            <a:extLst>
+              <a:ext uri="{FF2B5EF4-FFF2-40B4-BE49-F238E27FC236}">
+                <a16:creationId xmlns:a16="http://schemas.microsoft.com/office/drawing/2014/main" id="{49B128BB-8292-E249-9888-70C8E959A83E}"/>
+              </a:ext>
+            </a:extLst>
+          </p:cNvPr>
+          <p:cNvSpPr/>
+          <p:nvPr/>
+        </p:nvSpPr>
+        <p:spPr>
+          <a:xfrm>
+            <a:off x="1572483" y="3820622"/>
+            <a:ext cx="2162177" cy="846666"/>
+          </a:xfrm>
+          <a:prstGeom prst="roundRect">
+            <a:avLst/>
+          </a:prstGeom>
+          <a:solidFill>
+            <a:srgbClr val="A5998C"/>
+          </a:solidFill>
+          <a:ln>
+            <a:noFill/>
+          </a:ln>
+        </p:spPr>
+        <p:style>
+          <a:lnRef idx="2">
+            <a:schemeClr val="accent1">
+              <a:shade val="50000"/>
+            </a:schemeClr>
+          </a:lnRef>
+          <a:fillRef idx="1">
+            <a:schemeClr val="accent1"/>
+          </a:fillRef>
+          <a:effectRef idx="0">
+            <a:schemeClr val="accent1"/>
+          </a:effectRef>
+          <a:fontRef idx="minor">
+            <a:schemeClr val="lt1"/>
+          </a:fontRef>
+        </p:style>
+        <p:txBody>
+          <a:bodyPr rtlCol="0" anchor="ctr"/>
+          <a:lstStyle/>
+          <a:p>
+            <a:pPr algn="ctr"/>
+            <a:r>
+              <a:rPr lang="en-US" dirty="0"/>
+              <a:t>HOBO Logger Tidbit Sensor Data</a:t>
+            </a:r>
+          </a:p>
+        </p:txBody>
+      </p:sp>
+      <p:sp>
+        <p:nvSpPr>
+          <p:cNvPr id="4" name="Rounded Rectangle 3">
+            <a:extLst>
+              <a:ext uri="{FF2B5EF4-FFF2-40B4-BE49-F238E27FC236}">
+                <a16:creationId xmlns:a16="http://schemas.microsoft.com/office/drawing/2014/main" id="{4E63E2D3-52C4-E441-BF0F-BF693695C2EB}"/>
+              </a:ext>
+            </a:extLst>
+          </p:cNvPr>
+          <p:cNvSpPr/>
+          <p:nvPr/>
+        </p:nvSpPr>
+        <p:spPr>
+          <a:xfrm>
+            <a:off x="1572484" y="4707466"/>
+            <a:ext cx="2162177" cy="846666"/>
+          </a:xfrm>
+          <a:prstGeom prst="roundRect">
+            <a:avLst/>
+          </a:prstGeom>
+          <a:solidFill>
+            <a:srgbClr val="A5867C"/>
+          </a:solidFill>
+          <a:ln>
+            <a:noFill/>
+          </a:ln>
+        </p:spPr>
+        <p:style>
+          <a:lnRef idx="2">
+            <a:schemeClr val="accent1">
+              <a:shade val="50000"/>
+            </a:schemeClr>
+          </a:lnRef>
+          <a:fillRef idx="1">
+            <a:schemeClr val="accent1"/>
+          </a:fillRef>
+          <a:effectRef idx="0">
+            <a:schemeClr val="accent1"/>
+          </a:effectRef>
+          <a:fontRef idx="minor">
+            <a:schemeClr val="lt1"/>
+          </a:fontRef>
+        </p:style>
+        <p:txBody>
+          <a:bodyPr rtlCol="0" anchor="ctr"/>
+          <a:lstStyle/>
+          <a:p>
+            <a:pPr algn="ctr"/>
+            <a:r>
+              <a:rPr lang="en-US" dirty="0"/>
+              <a:t>HOBO Logger Conductivity</a:t>
+            </a:r>
+          </a:p>
+          <a:p>
+            <a:pPr algn="ctr"/>
+            <a:r>
+              <a:rPr lang="en-US" dirty="0"/>
+              <a:t> Sensor Data</a:t>
+            </a:r>
+          </a:p>
+        </p:txBody>
+      </p:sp>
+      <p:sp>
+        <p:nvSpPr>
+          <p:cNvPr id="5" name="Rounded Rectangle 4">
+            <a:extLst>
+              <a:ext uri="{FF2B5EF4-FFF2-40B4-BE49-F238E27FC236}">
+                <a16:creationId xmlns:a16="http://schemas.microsoft.com/office/drawing/2014/main" id="{9CA9768B-A224-284E-A766-7567243E6613}"/>
+              </a:ext>
+            </a:extLst>
+          </p:cNvPr>
+          <p:cNvSpPr/>
+          <p:nvPr/>
+        </p:nvSpPr>
+        <p:spPr>
+          <a:xfrm>
+            <a:off x="1572483" y="5594310"/>
+            <a:ext cx="2162177" cy="846666"/>
+          </a:xfrm>
+          <a:prstGeom prst="roundRect">
+            <a:avLst/>
+          </a:prstGeom>
+          <a:solidFill>
+            <a:srgbClr val="A57983"/>
+          </a:solidFill>
+          <a:ln>
+            <a:noFill/>
+          </a:ln>
+        </p:spPr>
+        <p:style>
+          <a:lnRef idx="2">
+            <a:schemeClr val="accent1">
+              <a:shade val="50000"/>
+            </a:schemeClr>
+          </a:lnRef>
+          <a:fillRef idx="1">
+            <a:schemeClr val="accent1"/>
+          </a:fillRef>
+          <a:effectRef idx="0">
+            <a:schemeClr val="accent1"/>
+          </a:effectRef>
+          <a:fontRef idx="minor">
+            <a:schemeClr val="lt1"/>
+          </a:fontRef>
+        </p:style>
+        <p:txBody>
+          <a:bodyPr rtlCol="0" anchor="ctr"/>
+          <a:lstStyle/>
+          <a:p>
+            <a:pPr algn="ctr"/>
+            <a:r>
+              <a:rPr lang="en-US" dirty="0"/>
+              <a:t>HOBO Logger DO probe Data</a:t>
+            </a:r>
+          </a:p>
+        </p:txBody>
+      </p:sp>
+      <p:sp>
+        <p:nvSpPr>
+          <p:cNvPr id="6" name="Rounded Rectangle 5">
+            <a:extLst>
+              <a:ext uri="{FF2B5EF4-FFF2-40B4-BE49-F238E27FC236}">
+                <a16:creationId xmlns:a16="http://schemas.microsoft.com/office/drawing/2014/main" id="{238D7C10-76A8-A847-A0FF-E3395CE6A6F6}"/>
+              </a:ext>
+            </a:extLst>
+          </p:cNvPr>
+          <p:cNvSpPr/>
+          <p:nvPr/>
+        </p:nvSpPr>
+        <p:spPr>
+          <a:xfrm>
+            <a:off x="4153956" y="1583423"/>
+            <a:ext cx="2162177" cy="846666"/>
+          </a:xfrm>
+          <a:prstGeom prst="roundRect">
+            <a:avLst/>
+          </a:prstGeom>
+          <a:solidFill>
+            <a:srgbClr val="A57B9A"/>
+          </a:solidFill>
+          <a:ln>
+            <a:noFill/>
+          </a:ln>
+        </p:spPr>
+        <p:style>
+          <a:lnRef idx="2">
+            <a:schemeClr val="accent1">
+              <a:shade val="50000"/>
+            </a:schemeClr>
+          </a:lnRef>
+          <a:fillRef idx="1">
+            <a:schemeClr val="accent1"/>
+          </a:fillRef>
+          <a:effectRef idx="0">
+            <a:schemeClr val="accent1"/>
+          </a:effectRef>
+          <a:fontRef idx="minor">
+            <a:schemeClr val="lt1"/>
+          </a:fontRef>
+        </p:style>
+        <p:txBody>
+          <a:bodyPr rtlCol="0" anchor="ctr"/>
+          <a:lstStyle/>
+          <a:p>
+            <a:pPr algn="ctr"/>
+            <a:r>
+              <a:rPr lang="en-US" dirty="0" err="1"/>
+              <a:t>dtank</a:t>
+            </a:r>
+            <a:endParaRPr lang="en-US" dirty="0"/>
+          </a:p>
+        </p:txBody>
+      </p:sp>
+      <p:sp>
+        <p:nvSpPr>
+          <p:cNvPr id="7" name="Rounded Rectangle 6">
+            <a:extLst>
+              <a:ext uri="{FF2B5EF4-FFF2-40B4-BE49-F238E27FC236}">
+                <a16:creationId xmlns:a16="http://schemas.microsoft.com/office/drawing/2014/main" id="{6302D817-718D-2847-903C-DAEC2B0B00F8}"/>
+              </a:ext>
+            </a:extLst>
+          </p:cNvPr>
+          <p:cNvSpPr/>
+          <p:nvPr/>
+        </p:nvSpPr>
+        <p:spPr>
+          <a:xfrm>
+            <a:off x="1572483" y="2046934"/>
+            <a:ext cx="2162177" cy="846666"/>
+          </a:xfrm>
+          <a:prstGeom prst="roundRect">
+            <a:avLst/>
+          </a:prstGeom>
+          <a:solidFill>
+            <a:srgbClr val="A1BCC4"/>
+          </a:solidFill>
+          <a:ln>
+            <a:noFill/>
+          </a:ln>
+        </p:spPr>
+        <p:style>
+          <a:lnRef idx="2">
+            <a:schemeClr val="accent1">
+              <a:shade val="50000"/>
+            </a:schemeClr>
+          </a:lnRef>
+          <a:fillRef idx="1">
+            <a:schemeClr val="accent1"/>
+          </a:fillRef>
+          <a:effectRef idx="0">
+            <a:schemeClr val="accent1"/>
+          </a:effectRef>
+          <a:fontRef idx="minor">
+            <a:schemeClr val="lt1"/>
+          </a:fontRef>
+        </p:style>
+        <p:txBody>
+          <a:bodyPr rtlCol="0" anchor="ctr"/>
+          <a:lstStyle/>
+          <a:p>
+            <a:pPr algn="ctr"/>
+            <a:r>
+              <a:rPr lang="en-US" dirty="0"/>
+              <a:t>UDA logs for temperature</a:t>
+            </a:r>
+          </a:p>
+        </p:txBody>
+      </p:sp>
+      <p:sp>
+        <p:nvSpPr>
+          <p:cNvPr id="8" name="Rounded Rectangle 7">
+            <a:extLst>
+              <a:ext uri="{FF2B5EF4-FFF2-40B4-BE49-F238E27FC236}">
+                <a16:creationId xmlns:a16="http://schemas.microsoft.com/office/drawing/2014/main" id="{48B74AD3-4B1D-6B45-BE2A-D2D05369C8F6}"/>
+              </a:ext>
+            </a:extLst>
+          </p:cNvPr>
+          <p:cNvSpPr/>
+          <p:nvPr/>
+        </p:nvSpPr>
+        <p:spPr>
+          <a:xfrm>
+            <a:off x="1572483" y="1160090"/>
+            <a:ext cx="2162177" cy="846666"/>
+          </a:xfrm>
+          <a:prstGeom prst="roundRect">
+            <a:avLst/>
+          </a:prstGeom>
+          <a:solidFill>
+            <a:srgbClr val="B4B2C4"/>
+          </a:solidFill>
+          <a:ln>
+            <a:noFill/>
+          </a:ln>
+        </p:spPr>
+        <p:style>
+          <a:lnRef idx="2">
+            <a:schemeClr val="accent1">
+              <a:shade val="50000"/>
+            </a:schemeClr>
+          </a:lnRef>
+          <a:fillRef idx="1">
+            <a:schemeClr val="accent1"/>
+          </a:fillRef>
+          <a:effectRef idx="0">
+            <a:schemeClr val="accent1"/>
+          </a:effectRef>
+          <a:fontRef idx="minor">
+            <a:schemeClr val="lt1"/>
+          </a:fontRef>
+        </p:style>
+        <p:txBody>
+          <a:bodyPr rtlCol="0" anchor="ctr"/>
+          <a:lstStyle/>
+          <a:p>
+            <a:pPr algn="ctr"/>
+            <a:r>
+              <a:rPr lang="en-US" dirty="0"/>
+              <a:t>UDA logs for water chemistry</a:t>
+            </a:r>
+          </a:p>
+        </p:txBody>
+      </p:sp>
+      <p:sp>
+        <p:nvSpPr>
+          <p:cNvPr id="9" name="Rounded Rectangle 8">
+            <a:extLst>
+              <a:ext uri="{FF2B5EF4-FFF2-40B4-BE49-F238E27FC236}">
+                <a16:creationId xmlns:a16="http://schemas.microsoft.com/office/drawing/2014/main" id="{68438EF8-2211-6F4A-8EDA-9A7E24E55A74}"/>
+              </a:ext>
+            </a:extLst>
+          </p:cNvPr>
+          <p:cNvSpPr/>
+          <p:nvPr/>
+        </p:nvSpPr>
+        <p:spPr>
+          <a:xfrm>
+            <a:off x="7027333" y="1160090"/>
+            <a:ext cx="4267200" cy="2057243"/>
+          </a:xfrm>
+          <a:prstGeom prst="roundRect">
+            <a:avLst/>
+          </a:prstGeom>
+          <a:solidFill>
+            <a:schemeClr val="bg1">
+              <a:lumMod val="85000"/>
+            </a:schemeClr>
+          </a:solidFill>
+          <a:ln>
+            <a:noFill/>
+          </a:ln>
+        </p:spPr>
+        <p:style>
+          <a:lnRef idx="2">
+            <a:schemeClr val="accent1">
+              <a:shade val="50000"/>
+            </a:schemeClr>
+          </a:lnRef>
+          <a:fillRef idx="1">
+            <a:schemeClr val="accent1"/>
+          </a:fillRef>
+          <a:effectRef idx="0">
+            <a:schemeClr val="accent1"/>
+          </a:effectRef>
+          <a:fontRef idx="minor">
+            <a:schemeClr val="lt1"/>
+          </a:fontRef>
+        </p:style>
+        <p:txBody>
+          <a:bodyPr rtlCol="0" anchor="ctr"/>
+          <a:lstStyle/>
+          <a:p>
+            <a:pPr algn="ctr"/>
+            <a:endParaRPr lang="en-US"/>
+          </a:p>
+        </p:txBody>
+      </p:sp>
+      <p:sp>
+        <p:nvSpPr>
+          <p:cNvPr id="10" name="Rounded Rectangle 9">
+            <a:extLst>
+              <a:ext uri="{FF2B5EF4-FFF2-40B4-BE49-F238E27FC236}">
+                <a16:creationId xmlns:a16="http://schemas.microsoft.com/office/drawing/2014/main" id="{9D9933F5-856C-C94A-9404-856670E5F973}"/>
+              </a:ext>
+            </a:extLst>
+          </p:cNvPr>
+          <p:cNvSpPr/>
+          <p:nvPr/>
+        </p:nvSpPr>
+        <p:spPr>
+          <a:xfrm>
+            <a:off x="7027333" y="3471489"/>
+            <a:ext cx="1964267" cy="1710111"/>
+          </a:xfrm>
+          <a:prstGeom prst="roundRect">
+            <a:avLst/>
+          </a:prstGeom>
+          <a:solidFill>
+            <a:schemeClr val="bg1">
+              <a:lumMod val="85000"/>
+            </a:schemeClr>
+          </a:solidFill>
+          <a:ln>
+            <a:noFill/>
+          </a:ln>
+        </p:spPr>
+        <p:style>
+          <a:lnRef idx="2">
+            <a:schemeClr val="accent1">
+              <a:shade val="50000"/>
+            </a:schemeClr>
+          </a:lnRef>
+          <a:fillRef idx="1">
+            <a:schemeClr val="accent1"/>
+          </a:fillRef>
+          <a:effectRef idx="0">
+            <a:schemeClr val="accent1"/>
+          </a:effectRef>
+          <a:fontRef idx="minor">
+            <a:schemeClr val="lt1"/>
+          </a:fontRef>
+        </p:style>
+        <p:txBody>
+          <a:bodyPr rtlCol="0" anchor="ctr"/>
+          <a:lstStyle/>
+          <a:p>
+            <a:pPr algn="ctr"/>
+            <a:endParaRPr lang="en-US"/>
+          </a:p>
+        </p:txBody>
+      </p:sp>
+      <p:sp>
+        <p:nvSpPr>
+          <p:cNvPr id="12" name="Rounded Rectangle 11">
+            <a:extLst>
+              <a:ext uri="{FF2B5EF4-FFF2-40B4-BE49-F238E27FC236}">
+                <a16:creationId xmlns:a16="http://schemas.microsoft.com/office/drawing/2014/main" id="{291A3F19-C960-114D-A73A-FA2978EDE820}"/>
+              </a:ext>
+            </a:extLst>
+          </p:cNvPr>
+          <p:cNvSpPr/>
+          <p:nvPr/>
+        </p:nvSpPr>
+        <p:spPr>
+          <a:xfrm>
+            <a:off x="9330266" y="3471489"/>
+            <a:ext cx="1964267" cy="1710111"/>
+          </a:xfrm>
+          <a:prstGeom prst="roundRect">
+            <a:avLst/>
+          </a:prstGeom>
+          <a:solidFill>
+            <a:schemeClr val="bg1">
+              <a:lumMod val="85000"/>
+            </a:schemeClr>
+          </a:solidFill>
+          <a:ln>
+            <a:noFill/>
+          </a:ln>
+        </p:spPr>
+        <p:style>
+          <a:lnRef idx="2">
+            <a:schemeClr val="accent1">
+              <a:shade val="50000"/>
+            </a:schemeClr>
+          </a:lnRef>
+          <a:fillRef idx="1">
+            <a:schemeClr val="accent1"/>
+          </a:fillRef>
+          <a:effectRef idx="0">
+            <a:schemeClr val="accent1"/>
+          </a:effectRef>
+          <a:fontRef idx="minor">
+            <a:schemeClr val="lt1"/>
+          </a:fontRef>
+        </p:style>
+        <p:txBody>
+          <a:bodyPr rtlCol="0" anchor="ctr"/>
+          <a:lstStyle/>
+          <a:p>
+            <a:pPr algn="ctr"/>
+            <a:endParaRPr lang="en-US" dirty="0"/>
+          </a:p>
+        </p:txBody>
+      </p:sp>
+      <p:sp>
+        <p:nvSpPr>
+          <p:cNvPr id="13" name="Rounded Rectangle 12">
+            <a:extLst>
+              <a:ext uri="{FF2B5EF4-FFF2-40B4-BE49-F238E27FC236}">
+                <a16:creationId xmlns:a16="http://schemas.microsoft.com/office/drawing/2014/main" id="{9EDC21BE-0089-1145-BE81-FEED2C751CC3}"/>
+              </a:ext>
+            </a:extLst>
+          </p:cNvPr>
+          <p:cNvSpPr/>
+          <p:nvPr/>
+        </p:nvSpPr>
+        <p:spPr>
+          <a:xfrm>
+            <a:off x="1572483" y="42489"/>
+            <a:ext cx="7419117" cy="846666"/>
+          </a:xfrm>
+          <a:prstGeom prst="roundRect">
+            <a:avLst/>
+          </a:prstGeom>
+          <a:solidFill>
+            <a:srgbClr val="BFC49B"/>
+          </a:solidFill>
+          <a:ln>
+            <a:noFill/>
+          </a:ln>
+        </p:spPr>
+        <p:style>
+          <a:lnRef idx="2">
+            <a:schemeClr val="accent1">
+              <a:shade val="50000"/>
+            </a:schemeClr>
+          </a:lnRef>
+          <a:fillRef idx="1">
+            <a:schemeClr val="accent1"/>
+          </a:fillRef>
+          <a:effectRef idx="0">
+            <a:schemeClr val="accent1"/>
+          </a:effectRef>
+          <a:fontRef idx="minor">
+            <a:schemeClr val="lt1"/>
+          </a:fontRef>
+        </p:style>
+        <p:txBody>
+          <a:bodyPr rtlCol="0" anchor="ctr"/>
+          <a:lstStyle/>
+          <a:p>
+            <a:pPr algn="ctr"/>
+            <a:r>
+              <a:rPr lang="en-US" dirty="0"/>
+              <a:t>Desired End State</a:t>
+            </a:r>
+          </a:p>
+        </p:txBody>
+      </p:sp>
+      <p:sp>
+        <p:nvSpPr>
+          <p:cNvPr id="15" name="Rounded Rectangle 14">
+            <a:extLst>
+              <a:ext uri="{FF2B5EF4-FFF2-40B4-BE49-F238E27FC236}">
+                <a16:creationId xmlns:a16="http://schemas.microsoft.com/office/drawing/2014/main" id="{137ABB21-F72C-804C-9616-C519650020A6}"/>
+              </a:ext>
+            </a:extLst>
+          </p:cNvPr>
+          <p:cNvSpPr/>
+          <p:nvPr/>
+        </p:nvSpPr>
+        <p:spPr>
+          <a:xfrm>
+            <a:off x="3962400" y="4385734"/>
+            <a:ext cx="4267200" cy="846666"/>
+          </a:xfrm>
+          <a:prstGeom prst="roundRect">
+            <a:avLst/>
+          </a:prstGeom>
+          <a:solidFill>
+            <a:schemeClr val="bg1">
+              <a:lumMod val="85000"/>
+            </a:schemeClr>
+          </a:solidFill>
+          <a:ln>
+            <a:noFill/>
+          </a:ln>
+        </p:spPr>
+        <p:style>
+          <a:lnRef idx="2">
+            <a:schemeClr val="accent1">
+              <a:shade val="50000"/>
+            </a:schemeClr>
+          </a:lnRef>
+          <a:fillRef idx="1">
+            <a:schemeClr val="accent1"/>
+          </a:fillRef>
+          <a:effectRef idx="0">
+            <a:schemeClr val="accent1"/>
+          </a:effectRef>
+          <a:fontRef idx="minor">
+            <a:schemeClr val="lt1"/>
+          </a:fontRef>
+        </p:style>
+        <p:txBody>
+          <a:bodyPr rtlCol="0" anchor="ctr"/>
+          <a:lstStyle/>
+          <a:p>
+            <a:pPr algn="ctr"/>
+            <a:endParaRPr lang="en-US"/>
+          </a:p>
+        </p:txBody>
+      </p:sp>
+      <p:sp>
+        <p:nvSpPr>
+          <p:cNvPr id="16" name="Rounded Rectangle 15">
+            <a:extLst>
+              <a:ext uri="{FF2B5EF4-FFF2-40B4-BE49-F238E27FC236}">
+                <a16:creationId xmlns:a16="http://schemas.microsoft.com/office/drawing/2014/main" id="{4011F616-092C-7944-B6C7-8C5CD75DDB37}"/>
+              </a:ext>
+            </a:extLst>
+          </p:cNvPr>
+          <p:cNvSpPr/>
+          <p:nvPr/>
+        </p:nvSpPr>
+        <p:spPr>
+          <a:xfrm rot="1082055">
+            <a:off x="9380570" y="609679"/>
+            <a:ext cx="2477893" cy="846666"/>
+          </a:xfrm>
+          <a:prstGeom prst="roundRect">
+            <a:avLst/>
+          </a:prstGeom>
+          <a:solidFill>
+            <a:srgbClr val="E4E189"/>
+          </a:solidFill>
+          <a:ln>
+            <a:noFill/>
+          </a:ln>
+        </p:spPr>
+        <p:style>
+          <a:lnRef idx="2">
+            <a:schemeClr val="accent1">
+              <a:shade val="50000"/>
+            </a:schemeClr>
+          </a:lnRef>
+          <a:fillRef idx="1">
+            <a:schemeClr val="accent1"/>
+          </a:fillRef>
+          <a:effectRef idx="0">
+            <a:schemeClr val="accent1"/>
+          </a:effectRef>
+          <a:fontRef idx="minor">
+            <a:schemeClr val="lt1"/>
+          </a:fontRef>
+        </p:style>
+        <p:txBody>
+          <a:bodyPr rtlCol="0" anchor="ctr"/>
+          <a:lstStyle/>
+          <a:p>
+            <a:pPr algn="ctr"/>
+            <a:r>
+              <a:rPr lang="en-US" dirty="0"/>
+              <a:t>Plots I want from the </a:t>
+            </a:r>
+            <a:r>
+              <a:rPr lang="en-US" dirty="0" err="1"/>
+              <a:t>dtank</a:t>
+            </a:r>
+            <a:r>
+              <a:rPr lang="en-US" dirty="0"/>
+              <a:t> database</a:t>
+            </a:r>
+          </a:p>
+        </p:txBody>
+      </p:sp>
+    </p:spTree>
+    <p:extLst>
+      <p:ext uri="{BB962C8B-B14F-4D97-AF65-F5344CB8AC3E}">
+        <p14:creationId xmlns:p14="http://schemas.microsoft.com/office/powerpoint/2010/main" val="3597777263"/>
+      </p:ext>
+    </p:extLst>
+  </p:cSld>
+  <p:clrMapOvr>
+    <a:masterClrMapping/>
+  </p:clrMapOvr>
+</p:sld>
+</file>
+
 <file path=ppt/theme/theme1.xml><?xml version="1.0" encoding="utf-8"?>
 <a:theme xmlns:a="http://schemas.openxmlformats.org/drawingml/2006/main" name="Office Theme">
   <a:themeElements>

</xml_diff>

<commit_message>
2020.01.10 1040PST pushing weekend work
</commit_message>
<xml_diff>
--- a/conceptdiagramforTankData.pptx
+++ b/conceptdiagramforTankData.pptx
@@ -108,6 +108,11 @@
       </a:defRPr>
     </a:lvl9pPr>
   </p:defaultTextStyle>
+  <p:extLst>
+    <p:ext uri="{EFAFB233-063F-42B5-8137-9DF3F51BA10A}">
+      <p15:sldGuideLst xmlns:p15="http://schemas.microsoft.com/office/powerpoint/2012/main"/>
+    </p:ext>
+  </p:extLst>
 </p:presentation>
 </file>
 
@@ -258,7 +263,7 @@
           <a:p>
             <a:fld id="{317EED82-1073-F249-952D-8504610DDAAD}" type="datetimeFigureOut">
               <a:rPr lang="en-US" smtClean="0"/>
-              <a:t>1/4/21</a:t>
+              <a:t>1/6/21</a:t>
             </a:fld>
             <a:endParaRPr lang="en-US"/>
           </a:p>
@@ -456,7 +461,7 @@
           <a:p>
             <a:fld id="{317EED82-1073-F249-952D-8504610DDAAD}" type="datetimeFigureOut">
               <a:rPr lang="en-US" smtClean="0"/>
-              <a:t>1/4/21</a:t>
+              <a:t>1/6/21</a:t>
             </a:fld>
             <a:endParaRPr lang="en-US"/>
           </a:p>
@@ -664,7 +669,7 @@
           <a:p>
             <a:fld id="{317EED82-1073-F249-952D-8504610DDAAD}" type="datetimeFigureOut">
               <a:rPr lang="en-US" smtClean="0"/>
-              <a:t>1/4/21</a:t>
+              <a:t>1/6/21</a:t>
             </a:fld>
             <a:endParaRPr lang="en-US"/>
           </a:p>
@@ -862,7 +867,7 @@
           <a:p>
             <a:fld id="{317EED82-1073-F249-952D-8504610DDAAD}" type="datetimeFigureOut">
               <a:rPr lang="en-US" smtClean="0"/>
-              <a:t>1/4/21</a:t>
+              <a:t>1/6/21</a:t>
             </a:fld>
             <a:endParaRPr lang="en-US"/>
           </a:p>
@@ -1137,7 +1142,7 @@
           <a:p>
             <a:fld id="{317EED82-1073-F249-952D-8504610DDAAD}" type="datetimeFigureOut">
               <a:rPr lang="en-US" smtClean="0"/>
-              <a:t>1/4/21</a:t>
+              <a:t>1/6/21</a:t>
             </a:fld>
             <a:endParaRPr lang="en-US"/>
           </a:p>
@@ -1402,7 +1407,7 @@
           <a:p>
             <a:fld id="{317EED82-1073-F249-952D-8504610DDAAD}" type="datetimeFigureOut">
               <a:rPr lang="en-US" smtClean="0"/>
-              <a:t>1/4/21</a:t>
+              <a:t>1/6/21</a:t>
             </a:fld>
             <a:endParaRPr lang="en-US"/>
           </a:p>
@@ -1814,7 +1819,7 @@
           <a:p>
             <a:fld id="{317EED82-1073-F249-952D-8504610DDAAD}" type="datetimeFigureOut">
               <a:rPr lang="en-US" smtClean="0"/>
-              <a:t>1/4/21</a:t>
+              <a:t>1/6/21</a:t>
             </a:fld>
             <a:endParaRPr lang="en-US"/>
           </a:p>
@@ -1955,7 +1960,7 @@
           <a:p>
             <a:fld id="{317EED82-1073-F249-952D-8504610DDAAD}" type="datetimeFigureOut">
               <a:rPr lang="en-US" smtClean="0"/>
-              <a:t>1/4/21</a:t>
+              <a:t>1/6/21</a:t>
             </a:fld>
             <a:endParaRPr lang="en-US"/>
           </a:p>
@@ -2068,7 +2073,7 @@
           <a:p>
             <a:fld id="{317EED82-1073-F249-952D-8504610DDAAD}" type="datetimeFigureOut">
               <a:rPr lang="en-US" smtClean="0"/>
-              <a:t>1/4/21</a:t>
+              <a:t>1/6/21</a:t>
             </a:fld>
             <a:endParaRPr lang="en-US"/>
           </a:p>
@@ -2379,7 +2384,7 @@
           <a:p>
             <a:fld id="{317EED82-1073-F249-952D-8504610DDAAD}" type="datetimeFigureOut">
               <a:rPr lang="en-US" smtClean="0"/>
-              <a:t>1/4/21</a:t>
+              <a:t>1/6/21</a:t>
             </a:fld>
             <a:endParaRPr lang="en-US"/>
           </a:p>
@@ -2667,7 +2672,7 @@
           <a:p>
             <a:fld id="{317EED82-1073-F249-952D-8504610DDAAD}" type="datetimeFigureOut">
               <a:rPr lang="en-US" smtClean="0"/>
-              <a:t>1/4/21</a:t>
+              <a:t>1/6/21</a:t>
             </a:fld>
             <a:endParaRPr lang="en-US"/>
           </a:p>
@@ -2908,7 +2913,7 @@
           <a:p>
             <a:fld id="{317EED82-1073-F249-952D-8504610DDAAD}" type="datetimeFigureOut">
               <a:rPr lang="en-US" smtClean="0"/>
-              <a:t>1/4/21</a:t>
+              <a:t>1/6/21</a:t>
             </a:fld>
             <a:endParaRPr lang="en-US"/>
           </a:p>
@@ -9057,108 +9062,129 @@
           <a:chExt cx="0" cy="0"/>
         </a:xfrm>
       </p:grpSpPr>
-      <p:sp>
-        <p:nvSpPr>
-          <p:cNvPr id="2" name="Rounded Rectangle 1">
+      <p:grpSp>
+        <p:nvGrpSpPr>
+          <p:cNvPr id="26" name="Group 25">
             <a:extLst>
               <a:ext uri="{FF2B5EF4-FFF2-40B4-BE49-F238E27FC236}">
-                <a16:creationId xmlns:a16="http://schemas.microsoft.com/office/drawing/2014/main" id="{2AD5BB21-C15F-F348-888F-633236D8E513}"/>
+                <a16:creationId xmlns:a16="http://schemas.microsoft.com/office/drawing/2014/main" id="{1C585C83-0339-B449-B9F6-86E06286EC8C}"/>
               </a:ext>
             </a:extLst>
           </p:cNvPr>
-          <p:cNvSpPr/>
+          <p:cNvGrpSpPr/>
           <p:nvPr/>
-        </p:nvSpPr>
-        <p:spPr>
+        </p:nvGrpSpPr>
+        <p:grpSpPr>
           <a:xfrm>
             <a:off x="3810000" y="1049867"/>
             <a:ext cx="846667" cy="846666"/>
+            <a:chOff x="3810000" y="1049867"/>
+            <a:chExt cx="846667" cy="846666"/>
           </a:xfrm>
-          <a:prstGeom prst="roundRect">
-            <a:avLst/>
-          </a:prstGeom>
-          <a:solidFill>
-            <a:schemeClr val="bg2">
-              <a:lumMod val="90000"/>
-            </a:schemeClr>
-          </a:solidFill>
-          <a:ln>
+        </p:grpSpPr>
+        <p:sp>
+          <p:nvSpPr>
+            <p:cNvPr id="2" name="Rounded Rectangle 1">
+              <a:extLst>
+                <a:ext uri="{FF2B5EF4-FFF2-40B4-BE49-F238E27FC236}">
+                  <a16:creationId xmlns:a16="http://schemas.microsoft.com/office/drawing/2014/main" id="{2AD5BB21-C15F-F348-888F-633236D8E513}"/>
+                </a:ext>
+              </a:extLst>
+            </p:cNvPr>
+            <p:cNvSpPr/>
+            <p:nvPr/>
+          </p:nvSpPr>
+          <p:spPr>
+            <a:xfrm>
+              <a:off x="3810000" y="1049867"/>
+              <a:ext cx="846667" cy="846666"/>
+            </a:xfrm>
+            <a:prstGeom prst="roundRect">
+              <a:avLst/>
+            </a:prstGeom>
+            <a:solidFill>
+              <a:schemeClr val="bg2">
+                <a:lumMod val="90000"/>
+              </a:schemeClr>
+            </a:solidFill>
+            <a:ln>
+              <a:noFill/>
+            </a:ln>
+          </p:spPr>
+          <p:style>
+            <a:lnRef idx="2">
+              <a:schemeClr val="accent1">
+                <a:shade val="50000"/>
+              </a:schemeClr>
+            </a:lnRef>
+            <a:fillRef idx="1">
+              <a:schemeClr val="accent1"/>
+            </a:fillRef>
+            <a:effectRef idx="0">
+              <a:schemeClr val="accent1"/>
+            </a:effectRef>
+            <a:fontRef idx="minor">
+              <a:schemeClr val="lt1"/>
+            </a:fontRef>
+          </p:style>
+          <p:txBody>
+            <a:bodyPr rtlCol="0" anchor="ctr"/>
+            <a:lstStyle/>
+            <a:p>
+              <a:pPr algn="ctr"/>
+              <a:endParaRPr lang="en-US"/>
+            </a:p>
+          </p:txBody>
+        </p:sp>
+        <p:pic>
+          <p:nvPicPr>
+            <p:cNvPr id="4" name="Picture 2" descr="Honeywell 50003691-501 dual input analytical analyzer">
+              <a:extLst>
+                <a:ext uri="{FF2B5EF4-FFF2-40B4-BE49-F238E27FC236}">
+                  <a16:creationId xmlns:a16="http://schemas.microsoft.com/office/drawing/2014/main" id="{AA901B2B-C5EF-064B-8E45-EBB238CD6663}"/>
+                </a:ext>
+              </a:extLst>
+            </p:cNvPr>
+            <p:cNvPicPr>
+              <a:picLocks noChangeAspect="1" noChangeArrowheads="1"/>
+            </p:cNvPicPr>
+            <p:nvPr/>
+          </p:nvPicPr>
+          <p:blipFill>
+            <a:blip r:embed="rId2">
+              <a:alphaModFix amt="58000"/>
+              <a:extLst>
+                <a:ext uri="{28A0092B-C50C-407E-A947-70E740481C1C}">
+                  <a14:useLocalDpi xmlns:a14="http://schemas.microsoft.com/office/drawing/2010/main" val="0"/>
+                </a:ext>
+              </a:extLst>
+            </a:blip>
+            <a:srcRect/>
+            <a:stretch>
+              <a:fillRect/>
+            </a:stretch>
+          </p:blipFill>
+          <p:spPr bwMode="auto">
+            <a:xfrm>
+              <a:off x="3975099" y="1214966"/>
+              <a:ext cx="516467" cy="516467"/>
+            </a:xfrm>
+            <a:prstGeom prst="rect">
+              <a:avLst/>
+            </a:prstGeom>
             <a:noFill/>
-          </a:ln>
-        </p:spPr>
-        <p:style>
-          <a:lnRef idx="2">
-            <a:schemeClr val="accent1">
-              <a:shade val="50000"/>
-            </a:schemeClr>
-          </a:lnRef>
-          <a:fillRef idx="1">
-            <a:schemeClr val="accent1"/>
-          </a:fillRef>
-          <a:effectRef idx="0">
-            <a:schemeClr val="accent1"/>
-          </a:effectRef>
-          <a:fontRef idx="minor">
-            <a:schemeClr val="lt1"/>
-          </a:fontRef>
-        </p:style>
-        <p:txBody>
-          <a:bodyPr rtlCol="0" anchor="ctr"/>
-          <a:lstStyle/>
-          <a:p>
-            <a:pPr algn="ctr"/>
-            <a:endParaRPr lang="en-US"/>
-          </a:p>
-        </p:txBody>
-      </p:sp>
-      <p:pic>
-        <p:nvPicPr>
-          <p:cNvPr id="4" name="Picture 2" descr="Honeywell 50003691-501 dual input analytical analyzer">
             <a:extLst>
-              <a:ext uri="{FF2B5EF4-FFF2-40B4-BE49-F238E27FC236}">
-                <a16:creationId xmlns:a16="http://schemas.microsoft.com/office/drawing/2014/main" id="{AA901B2B-C5EF-064B-8E45-EBB238CD6663}"/>
+              <a:ext uri="{909E8E84-426E-40DD-AFC4-6F175D3DCCD1}">
+                <a14:hiddenFill xmlns:a14="http://schemas.microsoft.com/office/drawing/2010/main">
+                  <a:solidFill>
+                    <a:srgbClr val="FFFFFF"/>
+                  </a:solidFill>
+                </a14:hiddenFill>
               </a:ext>
             </a:extLst>
-          </p:cNvPr>
-          <p:cNvPicPr>
-            <a:picLocks noChangeAspect="1" noChangeArrowheads="1"/>
-          </p:cNvPicPr>
-          <p:nvPr/>
-        </p:nvPicPr>
-        <p:blipFill>
-          <a:blip r:embed="rId2">
-            <a:alphaModFix amt="58000"/>
-            <a:extLst>
-              <a:ext uri="{28A0092B-C50C-407E-A947-70E740481C1C}">
-                <a14:useLocalDpi xmlns:a14="http://schemas.microsoft.com/office/drawing/2010/main" val="0"/>
-              </a:ext>
-            </a:extLst>
-          </a:blip>
-          <a:srcRect/>
-          <a:stretch>
-            <a:fillRect/>
-          </a:stretch>
-        </p:blipFill>
-        <p:spPr bwMode="auto">
-          <a:xfrm>
-            <a:off x="3975099" y="1214966"/>
-            <a:ext cx="516467" cy="516467"/>
-          </a:xfrm>
-          <a:prstGeom prst="rect">
-            <a:avLst/>
-          </a:prstGeom>
-          <a:noFill/>
-          <a:extLst>
-            <a:ext uri="{909E8E84-426E-40DD-AFC4-6F175D3DCCD1}">
-              <a14:hiddenFill xmlns:a14="http://schemas.microsoft.com/office/drawing/2010/main">
-                <a:solidFill>
-                  <a:srgbClr val="FFFFFF"/>
-                </a:solidFill>
-              </a14:hiddenFill>
-            </a:ext>
-          </a:extLst>
-        </p:spPr>
-      </p:pic>
+          </p:spPr>
+        </p:pic>
+      </p:grpSp>
       <p:grpSp>
         <p:nvGrpSpPr>
           <p:cNvPr id="7" name="Group 6">
@@ -10158,15 +10184,6 @@
                 <a:avLst/>
               </a:prstGeom>
               <a:grpFill/>
-              <a:extLst>
-                <a:ext uri="{909E8E84-426E-40DD-AFC4-6F175D3DCCD1}">
-                  <a14:hiddenFill xmlns:a14="http://schemas.microsoft.com/office/drawing/2010/main">
-                    <a:solidFill>
-                      <a:srgbClr val="FFFFFF"/>
-                    </a:solidFill>
-                  </a14:hiddenFill>
-                </a:ext>
-              </a:extLst>
             </p:spPr>
           </p:pic>
         </p:grpSp>
@@ -10280,15 +10297,6 @@
                 <a:avLst/>
               </a:prstGeom>
               <a:grpFill/>
-              <a:extLst>
-                <a:ext uri="{909E8E84-426E-40DD-AFC4-6F175D3DCCD1}">
-                  <a14:hiddenFill xmlns:a14="http://schemas.microsoft.com/office/drawing/2010/main">
-                    <a:solidFill>
-                      <a:srgbClr val="FFFFFF"/>
-                    </a:solidFill>
-                  </a14:hiddenFill>
-                </a:ext>
-              </a:extLst>
             </p:spPr>
           </p:pic>
         </p:grpSp>
@@ -10402,15 +10410,6 @@
                 <a:avLst/>
               </a:prstGeom>
               <a:grpFill/>
-              <a:extLst>
-                <a:ext uri="{909E8E84-426E-40DD-AFC4-6F175D3DCCD1}">
-                  <a14:hiddenFill xmlns:a14="http://schemas.microsoft.com/office/drawing/2010/main">
-                    <a:solidFill>
-                      <a:srgbClr val="FFFFFF"/>
-                    </a:solidFill>
-                  </a14:hiddenFill>
-                </a:ext>
-              </a:extLst>
             </p:spPr>
           </p:pic>
         </p:grpSp>
@@ -10524,15 +10523,6 @@
                 <a:avLst/>
               </a:prstGeom>
               <a:grpFill/>
-              <a:extLst>
-                <a:ext uri="{909E8E84-426E-40DD-AFC4-6F175D3DCCD1}">
-                  <a14:hiddenFill xmlns:a14="http://schemas.microsoft.com/office/drawing/2010/main">
-                    <a:solidFill>
-                      <a:srgbClr val="FFFFFF"/>
-                    </a:solidFill>
-                  </a14:hiddenFill>
-                </a:ext>
-              </a:extLst>
             </p:spPr>
           </p:pic>
         </p:grpSp>
@@ -10646,15 +10636,6 @@
                 <a:avLst/>
               </a:prstGeom>
               <a:grpFill/>
-              <a:extLst>
-                <a:ext uri="{909E8E84-426E-40DD-AFC4-6F175D3DCCD1}">
-                  <a14:hiddenFill xmlns:a14="http://schemas.microsoft.com/office/drawing/2010/main">
-                    <a:solidFill>
-                      <a:srgbClr val="FFFFFF"/>
-                    </a:solidFill>
-                  </a14:hiddenFill>
-                </a:ext>
-              </a:extLst>
             </p:spPr>
           </p:pic>
         </p:grpSp>
@@ -10768,19 +10749,65 @@
                 <a:avLst/>
               </a:prstGeom>
               <a:grpFill/>
-              <a:extLst>
-                <a:ext uri="{909E8E84-426E-40DD-AFC4-6F175D3DCCD1}">
-                  <a14:hiddenFill xmlns:a14="http://schemas.microsoft.com/office/drawing/2010/main">
-                    <a:solidFill>
-                      <a:srgbClr val="FFFFFF"/>
-                    </a:solidFill>
-                  </a14:hiddenFill>
-                </a:ext>
-              </a:extLst>
             </p:spPr>
           </p:pic>
         </p:grpSp>
       </p:grpSp>
+      <p:sp>
+        <p:nvSpPr>
+          <p:cNvPr id="45" name="Rounded Rectangle 44">
+            <a:extLst>
+              <a:ext uri="{FF2B5EF4-FFF2-40B4-BE49-F238E27FC236}">
+                <a16:creationId xmlns:a16="http://schemas.microsoft.com/office/drawing/2014/main" id="{2571A86C-2608-4C40-8E77-24DF607737F4}"/>
+              </a:ext>
+            </a:extLst>
+          </p:cNvPr>
+          <p:cNvSpPr/>
+          <p:nvPr/>
+        </p:nvSpPr>
+        <p:spPr>
+          <a:xfrm>
+            <a:off x="520841" y="120652"/>
+            <a:ext cx="4991109" cy="846666"/>
+          </a:xfrm>
+          <a:prstGeom prst="roundRect">
+            <a:avLst/>
+          </a:prstGeom>
+          <a:solidFill>
+            <a:srgbClr val="7F80AB"/>
+          </a:solidFill>
+          <a:ln>
+            <a:noFill/>
+          </a:ln>
+        </p:spPr>
+        <p:style>
+          <a:lnRef idx="2">
+            <a:schemeClr val="accent1">
+              <a:shade val="50000"/>
+            </a:schemeClr>
+          </a:lnRef>
+          <a:fillRef idx="1">
+            <a:schemeClr val="accent1"/>
+          </a:fillRef>
+          <a:effectRef idx="0">
+            <a:schemeClr val="accent1"/>
+          </a:effectRef>
+          <a:fontRef idx="minor">
+            <a:schemeClr val="lt1"/>
+          </a:fontRef>
+        </p:style>
+        <p:txBody>
+          <a:bodyPr rtlCol="0" anchor="ctr"/>
+          <a:lstStyle/>
+          <a:p>
+            <a:pPr algn="ctr"/>
+            <a:r>
+              <a:rPr lang="en-US" dirty="0"/>
+              <a:t>UDA logs for Conductivity</a:t>
+            </a:r>
+          </a:p>
+        </p:txBody>
+      </p:sp>
     </p:spTree>
     <p:extLst>
       <p:ext uri="{BB962C8B-B14F-4D97-AF65-F5344CB8AC3E}">
@@ -12983,6 +13010,61 @@
           </a:p>
         </p:txBody>
       </p:sp>
+      <p:sp>
+        <p:nvSpPr>
+          <p:cNvPr id="17" name="Rounded Rectangle 16">
+            <a:extLst>
+              <a:ext uri="{FF2B5EF4-FFF2-40B4-BE49-F238E27FC236}">
+                <a16:creationId xmlns:a16="http://schemas.microsoft.com/office/drawing/2014/main" id="{B046F209-6F4A-5A41-833A-F6A165063213}"/>
+              </a:ext>
+            </a:extLst>
+          </p:cNvPr>
+          <p:cNvSpPr/>
+          <p:nvPr/>
+        </p:nvSpPr>
+        <p:spPr>
+          <a:xfrm>
+            <a:off x="1572483" y="246916"/>
+            <a:ext cx="2162177" cy="846666"/>
+          </a:xfrm>
+          <a:prstGeom prst="roundRect">
+            <a:avLst/>
+          </a:prstGeom>
+          <a:solidFill>
+            <a:srgbClr val="7F80AB"/>
+          </a:solidFill>
+          <a:ln>
+            <a:noFill/>
+          </a:ln>
+        </p:spPr>
+        <p:style>
+          <a:lnRef idx="2">
+            <a:schemeClr val="accent1">
+              <a:shade val="50000"/>
+            </a:schemeClr>
+          </a:lnRef>
+          <a:fillRef idx="1">
+            <a:schemeClr val="accent1"/>
+          </a:fillRef>
+          <a:effectRef idx="0">
+            <a:schemeClr val="accent1"/>
+          </a:effectRef>
+          <a:fontRef idx="minor">
+            <a:schemeClr val="lt1"/>
+          </a:fontRef>
+        </p:style>
+        <p:txBody>
+          <a:bodyPr rtlCol="0" anchor="ctr"/>
+          <a:lstStyle/>
+          <a:p>
+            <a:pPr algn="ctr"/>
+            <a:r>
+              <a:rPr lang="en-US" dirty="0"/>
+              <a:t>UDA logs for Conductivity</a:t>
+            </a:r>
+          </a:p>
+        </p:txBody>
+      </p:sp>
     </p:spTree>
     <p:extLst>
       <p:ext uri="{BB962C8B-B14F-4D97-AF65-F5344CB8AC3E}">

</xml_diff>